<commit_message>
Added HNB TM disclaimer to make Legal happy. Note still no HNB-specific content.
</commit_message>
<xml_diff>
--- a/The Unix Philosophy - Attributed - 2019-09-11.pptx
+++ b/The Unix Philosophy - Attributed - 2019-09-11.pptx
@@ -212,7 +212,7 @@
           <a:p>
             <a:fld id="{A5F5E26E-66A7-4B62-B7F0-7F248595D5F5}" type="datetimeFigureOut">
               <a:rPr lang="en-US" smtClean="0"/>
-              <a:t>9/11/2019</a:t>
+              <a:t>10/1/2019</a:t>
             </a:fld>
             <a:endParaRPr lang="en-US"/>
           </a:p>
@@ -2746,7 +2746,7 @@
             <a:fld id="{B61BEF0D-F0BB-DE4B-95CE-6DB70DBA9567}" type="datetimeFigureOut">
               <a:rPr lang="en-US" dirty="0"/>
               <a:pPr/>
-              <a:t>9/11/2019</a:t>
+              <a:t>10/1/2019</a:t>
             </a:fld>
             <a:endParaRPr lang="en-US" dirty="0"/>
           </a:p>
@@ -2994,7 +2994,7 @@
             <a:fld id="{B61BEF0D-F0BB-DE4B-95CE-6DB70DBA9567}" type="datetimeFigureOut">
               <a:rPr lang="en-US" dirty="0"/>
               <a:pPr/>
-              <a:t>9/11/2019</a:t>
+              <a:t>10/1/2019</a:t>
             </a:fld>
             <a:endParaRPr lang="en-US" dirty="0"/>
           </a:p>
@@ -3305,7 +3305,7 @@
             <a:fld id="{B61BEF0D-F0BB-DE4B-95CE-6DB70DBA9567}" type="datetimeFigureOut">
               <a:rPr lang="en-US" dirty="0"/>
               <a:pPr/>
-              <a:t>9/11/2019</a:t>
+              <a:t>10/1/2019</a:t>
             </a:fld>
             <a:endParaRPr lang="en-US" dirty="0"/>
           </a:p>
@@ -3643,7 +3643,7 @@
             <a:fld id="{B61BEF0D-F0BB-DE4B-95CE-6DB70DBA9567}" type="datetimeFigureOut">
               <a:rPr lang="en-US" dirty="0"/>
               <a:pPr/>
-              <a:t>9/11/2019</a:t>
+              <a:t>10/1/2019</a:t>
             </a:fld>
             <a:endParaRPr lang="en-US" dirty="0"/>
           </a:p>
@@ -3954,7 +3954,7 @@
             <a:fld id="{B61BEF0D-F0BB-DE4B-95CE-6DB70DBA9567}" type="datetimeFigureOut">
               <a:rPr lang="en-US" dirty="0"/>
               <a:pPr/>
-              <a:t>9/11/2019</a:t>
+              <a:t>10/1/2019</a:t>
             </a:fld>
             <a:endParaRPr lang="en-US" dirty="0"/>
           </a:p>
@@ -4344,7 +4344,7 @@
             <a:fld id="{B61BEF0D-F0BB-DE4B-95CE-6DB70DBA9567}" type="datetimeFigureOut">
               <a:rPr lang="en-US" dirty="0"/>
               <a:pPr/>
-              <a:t>9/11/2019</a:t>
+              <a:t>10/1/2019</a:t>
             </a:fld>
             <a:endParaRPr lang="en-US" dirty="0"/>
           </a:p>
@@ -4510,7 +4510,7 @@
           <a:p>
             <a:fld id="{55C6B4A9-1611-4792-9094-5F34BCA07E0B}" type="datetimeFigureOut">
               <a:rPr lang="en-US" dirty="0"/>
-              <a:t>9/11/2019</a:t>
+              <a:t>10/1/2019</a:t>
             </a:fld>
             <a:endParaRPr lang="en-US" dirty="0"/>
           </a:p>
@@ -4686,7 +4686,7 @@
             <a:fld id="{B61BEF0D-F0BB-DE4B-95CE-6DB70DBA9567}" type="datetimeFigureOut">
               <a:rPr lang="en-US" dirty="0"/>
               <a:pPr/>
-              <a:t>9/11/2019</a:t>
+              <a:t>10/1/2019</a:t>
             </a:fld>
             <a:endParaRPr lang="en-US" dirty="0"/>
           </a:p>
@@ -4859,7 +4859,7 @@
             <a:fld id="{B61BEF0D-F0BB-DE4B-95CE-6DB70DBA9567}" type="datetimeFigureOut">
               <a:rPr lang="en-US" dirty="0"/>
               <a:pPr/>
-              <a:t>9/11/2019</a:t>
+              <a:t>10/1/2019</a:t>
             </a:fld>
             <a:endParaRPr lang="en-US" dirty="0"/>
           </a:p>
@@ -5103,7 +5103,7 @@
             <a:fld id="{B61BEF0D-F0BB-DE4B-95CE-6DB70DBA9567}" type="datetimeFigureOut">
               <a:rPr lang="en-US" dirty="0"/>
               <a:pPr/>
-              <a:t>9/11/2019</a:t>
+              <a:t>10/1/2019</a:t>
             </a:fld>
             <a:endParaRPr lang="en-US" dirty="0"/>
           </a:p>
@@ -5331,7 +5331,7 @@
           <a:p>
             <a:fld id="{EB712588-04B1-427B-82EE-E8DB90309F08}" type="datetimeFigureOut">
               <a:rPr lang="en-US" dirty="0"/>
-              <a:t>9/11/2019</a:t>
+              <a:t>10/1/2019</a:t>
             </a:fld>
             <a:endParaRPr lang="en-US" dirty="0"/>
           </a:p>
@@ -5701,7 +5701,7 @@
             <a:fld id="{B61BEF0D-F0BB-DE4B-95CE-6DB70DBA9567}" type="datetimeFigureOut">
               <a:rPr lang="en-US" dirty="0"/>
               <a:pPr/>
-              <a:t>9/11/2019</a:t>
+              <a:t>10/1/2019</a:t>
             </a:fld>
             <a:endParaRPr lang="en-US" dirty="0"/>
           </a:p>
@@ -5821,7 +5821,7 @@
             <a:fld id="{B61BEF0D-F0BB-DE4B-95CE-6DB70DBA9567}" type="datetimeFigureOut">
               <a:rPr lang="en-US" dirty="0"/>
               <a:pPr/>
-              <a:t>9/11/2019</a:t>
+              <a:t>10/1/2019</a:t>
             </a:fld>
             <a:endParaRPr lang="en-US" dirty="0"/>
           </a:p>
@@ -5913,7 +5913,7 @@
             <a:fld id="{B61BEF0D-F0BB-DE4B-95CE-6DB70DBA9567}" type="datetimeFigureOut">
               <a:rPr lang="en-US" dirty="0"/>
               <a:pPr/>
-              <a:t>9/11/2019</a:t>
+              <a:t>10/1/2019</a:t>
             </a:fld>
             <a:endParaRPr lang="en-US" dirty="0"/>
           </a:p>
@@ -6164,7 +6164,7 @@
           <a:p>
             <a:fld id="{42A54C80-263E-416B-A8E0-580EDEADCBDC}" type="datetimeFigureOut">
               <a:rPr lang="en-US" dirty="0"/>
-              <a:t>9/11/2019</a:t>
+              <a:t>10/1/2019</a:t>
             </a:fld>
             <a:endParaRPr lang="en-US" dirty="0"/>
           </a:p>
@@ -6423,7 +6423,7 @@
             <a:fld id="{B61BEF0D-F0BB-DE4B-95CE-6DB70DBA9567}" type="datetimeFigureOut">
               <a:rPr lang="en-US" dirty="0"/>
               <a:pPr/>
-              <a:t>9/11/2019</a:t>
+              <a:t>10/1/2019</a:t>
             </a:fld>
             <a:endParaRPr lang="en-US" dirty="0"/>
           </a:p>
@@ -7163,7 +7163,7 @@
             <a:fld id="{B61BEF0D-F0BB-DE4B-95CE-6DB70DBA9567}" type="datetimeFigureOut">
               <a:rPr lang="en-US" dirty="0"/>
               <a:pPr/>
-              <a:t>9/11/2019</a:t>
+              <a:t>10/1/2019</a:t>
             </a:fld>
             <a:endParaRPr lang="en-US" dirty="0"/>
           </a:p>
@@ -8643,6 +8643,40 @@
           </a:p>
         </p:txBody>
       </p:sp>
+      <p:sp>
+        <p:nvSpPr>
+          <p:cNvPr id="11" name="Rectangle 10">
+            <a:extLst>
+              <a:ext uri="{FF2B5EF4-FFF2-40B4-BE49-F238E27FC236}">
+                <a16:creationId xmlns:a16="http://schemas.microsoft.com/office/drawing/2014/main" id="{3DC3B9E7-6970-454E-B9BD-8B8BEE039657}"/>
+              </a:ext>
+            </a:extLst>
+          </p:cNvPr>
+          <p:cNvSpPr/>
+          <p:nvPr/>
+        </p:nvSpPr>
+        <p:spPr>
+          <a:xfrm>
+            <a:off x="0" y="6346845"/>
+            <a:ext cx="4531983" cy="507831"/>
+          </a:xfrm>
+          <a:prstGeom prst="rect">
+            <a:avLst/>
+          </a:prstGeom>
+        </p:spPr>
+        <p:txBody>
+          <a:bodyPr wrap="square">
+            <a:spAutoFit/>
+          </a:bodyPr>
+          <a:lstStyle/>
+          <a:p>
+            <a:r>
+              <a:rPr lang="en-US" sz="900" dirty="0"/>
+              <a:t>The Huntington National Bank is Member FDIC. ®, Huntington® and  Huntington. Welcome.® are federally registered service marks of Huntington Bancshares Incorporated.  © 2019 Huntington Bancshares Incorporated.</a:t>
+            </a:r>
+          </a:p>
+        </p:txBody>
+      </p:sp>
     </p:spTree>
     <p:extLst>
       <p:ext uri="{BB962C8B-B14F-4D97-AF65-F5344CB8AC3E}">
@@ -14660,12 +14694,6 @@
 </file>
 
 <file path=customXml/item1.xml><?xml version="1.0" encoding="utf-8"?>
-<p:properties xmlns:p="http://schemas.microsoft.com/office/2006/metadata/properties" xmlns:xsi="http://www.w3.org/2001/XMLSchema-instance" xmlns:pc="http://schemas.microsoft.com/office/infopath/2007/PartnerControls">
-  <documentManagement/>
-</p:properties>
-</file>
-
-<file path=customXml/item2.xml><?xml version="1.0" encoding="utf-8"?>
 <ct:contentTypeSchema xmlns:ct="http://schemas.microsoft.com/office/2006/metadata/contentType" xmlns:ma="http://schemas.microsoft.com/office/2006/metadata/properties/metaAttributes" ct:_="" ma:_="" ma:contentTypeName="Document" ma:contentTypeID="0x010100999C4FC1E27B604AB083C5A2EF450DFC" ma:contentTypeVersion="0" ma:contentTypeDescription="Create a new document." ma:contentTypeScope="" ma:versionID="33e62442aba9e8183c430b9529e05696">
   <xsd:schema xmlns:xsd="http://www.w3.org/2001/XMLSchema" xmlns:xs="http://www.w3.org/2001/XMLSchema" xmlns:p="http://schemas.microsoft.com/office/2006/metadata/properties" targetNamespace="http://schemas.microsoft.com/office/2006/metadata/properties" ma:root="true" ma:fieldsID="1b05d82d297216baf5b26c55225140df">
     <xsd:element name="properties">
@@ -14779,6 +14807,12 @@
 </ct:contentTypeSchema>
 </file>
 
+<file path=customXml/item2.xml><?xml version="1.0" encoding="utf-8"?>
+<p:properties xmlns:p="http://schemas.microsoft.com/office/2006/metadata/properties" xmlns:xsi="http://www.w3.org/2001/XMLSchema-instance" xmlns:pc="http://schemas.microsoft.com/office/infopath/2007/PartnerControls">
+  <documentManagement/>
+</p:properties>
+</file>
+
 <file path=customXml/item3.xml><?xml version="1.0" encoding="utf-8"?>
 <?mso-contentType ?>
 <FormTemplates xmlns="http://schemas.microsoft.com/sharepoint/v3/contenttype/forms">
@@ -14789,21 +14823,6 @@
 </file>
 
 <file path=customXml/itemProps1.xml><?xml version="1.0" encoding="utf-8"?>
-<ds:datastoreItem xmlns:ds="http://schemas.openxmlformats.org/officeDocument/2006/customXml" ds:itemID="{1216D02C-A6EB-45B3-A6B2-3D1DF222F307}">
-  <ds:schemaRefs>
-    <ds:schemaRef ds:uri="http://purl.org/dc/terms/"/>
-    <ds:schemaRef ds:uri="http://schemas.openxmlformats.org/package/2006/metadata/core-properties"/>
-    <ds:schemaRef ds:uri="http://schemas.microsoft.com/office/2006/documentManagement/types"/>
-    <ds:schemaRef ds:uri="http://schemas.microsoft.com/office/infopath/2007/PartnerControls"/>
-    <ds:schemaRef ds:uri="http://purl.org/dc/elements/1.1/"/>
-    <ds:schemaRef ds:uri="http://schemas.microsoft.com/office/2006/metadata/properties"/>
-    <ds:schemaRef ds:uri="http://www.w3.org/XML/1998/namespace"/>
-    <ds:schemaRef ds:uri="http://purl.org/dc/dcmitype/"/>
-  </ds:schemaRefs>
-</ds:datastoreItem>
-</file>
-
-<file path=customXml/itemProps2.xml><?xml version="1.0" encoding="utf-8"?>
 <ds:datastoreItem xmlns:ds="http://schemas.openxmlformats.org/officeDocument/2006/customXml" ds:itemID="{A8ED9177-9849-439D-B4A9-EBD14F4EE18D}">
   <ds:schemaRefs>
     <ds:schemaRef ds:uri="http://schemas.microsoft.com/office/2006/metadata/contentType"/>
@@ -14819,6 +14838,21 @@
 </ds:datastoreItem>
 </file>
 
+<file path=customXml/itemProps2.xml><?xml version="1.0" encoding="utf-8"?>
+<ds:datastoreItem xmlns:ds="http://schemas.openxmlformats.org/officeDocument/2006/customXml" ds:itemID="{1216D02C-A6EB-45B3-A6B2-3D1DF222F307}">
+  <ds:schemaRefs>
+    <ds:schemaRef ds:uri="http://purl.org/dc/terms/"/>
+    <ds:schemaRef ds:uri="http://schemas.openxmlformats.org/package/2006/metadata/core-properties"/>
+    <ds:schemaRef ds:uri="http://schemas.microsoft.com/office/2006/documentManagement/types"/>
+    <ds:schemaRef ds:uri="http://schemas.microsoft.com/office/infopath/2007/PartnerControls"/>
+    <ds:schemaRef ds:uri="http://purl.org/dc/elements/1.1/"/>
+    <ds:schemaRef ds:uri="http://schemas.microsoft.com/office/2006/metadata/properties"/>
+    <ds:schemaRef ds:uri="http://www.w3.org/XML/1998/namespace"/>
+    <ds:schemaRef ds:uri="http://purl.org/dc/dcmitype/"/>
+  </ds:schemaRefs>
+</ds:datastoreItem>
+</file>
+
 <file path=customXml/itemProps3.xml><?xml version="1.0" encoding="utf-8"?>
 <ds:datastoreItem xmlns:ds="http://schemas.openxmlformats.org/officeDocument/2006/customXml" ds:itemID="{F218C08F-A677-43C3-BF8E-C9EC5ECE9826}">
   <ds:schemaRefs>

</xml_diff>

<commit_message>
Updated HNB TM disclaimer
</commit_message>
<xml_diff>
--- a/The Unix Philosophy - Attributed - 2019-09-11.pptx
+++ b/The Unix Philosophy - Attributed - 2019-09-11.pptx
@@ -212,7 +212,7 @@
           <a:p>
             <a:fld id="{A5F5E26E-66A7-4B62-B7F0-7F248595D5F5}" type="datetimeFigureOut">
               <a:rPr lang="en-US" smtClean="0"/>
-              <a:t>10/1/2019</a:t>
+              <a:t>10/2/2019</a:t>
             </a:fld>
             <a:endParaRPr lang="en-US"/>
           </a:p>
@@ -2746,7 +2746,7 @@
             <a:fld id="{B61BEF0D-F0BB-DE4B-95CE-6DB70DBA9567}" type="datetimeFigureOut">
               <a:rPr lang="en-US" dirty="0"/>
               <a:pPr/>
-              <a:t>10/1/2019</a:t>
+              <a:t>10/2/2019</a:t>
             </a:fld>
             <a:endParaRPr lang="en-US" dirty="0"/>
           </a:p>
@@ -2994,7 +2994,7 @@
             <a:fld id="{B61BEF0D-F0BB-DE4B-95CE-6DB70DBA9567}" type="datetimeFigureOut">
               <a:rPr lang="en-US" dirty="0"/>
               <a:pPr/>
-              <a:t>10/1/2019</a:t>
+              <a:t>10/2/2019</a:t>
             </a:fld>
             <a:endParaRPr lang="en-US" dirty="0"/>
           </a:p>
@@ -3305,7 +3305,7 @@
             <a:fld id="{B61BEF0D-F0BB-DE4B-95CE-6DB70DBA9567}" type="datetimeFigureOut">
               <a:rPr lang="en-US" dirty="0"/>
               <a:pPr/>
-              <a:t>10/1/2019</a:t>
+              <a:t>10/2/2019</a:t>
             </a:fld>
             <a:endParaRPr lang="en-US" dirty="0"/>
           </a:p>
@@ -3643,7 +3643,7 @@
             <a:fld id="{B61BEF0D-F0BB-DE4B-95CE-6DB70DBA9567}" type="datetimeFigureOut">
               <a:rPr lang="en-US" dirty="0"/>
               <a:pPr/>
-              <a:t>10/1/2019</a:t>
+              <a:t>10/2/2019</a:t>
             </a:fld>
             <a:endParaRPr lang="en-US" dirty="0"/>
           </a:p>
@@ -3954,7 +3954,7 @@
             <a:fld id="{B61BEF0D-F0BB-DE4B-95CE-6DB70DBA9567}" type="datetimeFigureOut">
               <a:rPr lang="en-US" dirty="0"/>
               <a:pPr/>
-              <a:t>10/1/2019</a:t>
+              <a:t>10/2/2019</a:t>
             </a:fld>
             <a:endParaRPr lang="en-US" dirty="0"/>
           </a:p>
@@ -4344,7 +4344,7 @@
             <a:fld id="{B61BEF0D-F0BB-DE4B-95CE-6DB70DBA9567}" type="datetimeFigureOut">
               <a:rPr lang="en-US" dirty="0"/>
               <a:pPr/>
-              <a:t>10/1/2019</a:t>
+              <a:t>10/2/2019</a:t>
             </a:fld>
             <a:endParaRPr lang="en-US" dirty="0"/>
           </a:p>
@@ -4510,7 +4510,7 @@
           <a:p>
             <a:fld id="{55C6B4A9-1611-4792-9094-5F34BCA07E0B}" type="datetimeFigureOut">
               <a:rPr lang="en-US" dirty="0"/>
-              <a:t>10/1/2019</a:t>
+              <a:t>10/2/2019</a:t>
             </a:fld>
             <a:endParaRPr lang="en-US" dirty="0"/>
           </a:p>
@@ -4686,7 +4686,7 @@
             <a:fld id="{B61BEF0D-F0BB-DE4B-95CE-6DB70DBA9567}" type="datetimeFigureOut">
               <a:rPr lang="en-US" dirty="0"/>
               <a:pPr/>
-              <a:t>10/1/2019</a:t>
+              <a:t>10/2/2019</a:t>
             </a:fld>
             <a:endParaRPr lang="en-US" dirty="0"/>
           </a:p>
@@ -4859,7 +4859,7 @@
             <a:fld id="{B61BEF0D-F0BB-DE4B-95CE-6DB70DBA9567}" type="datetimeFigureOut">
               <a:rPr lang="en-US" dirty="0"/>
               <a:pPr/>
-              <a:t>10/1/2019</a:t>
+              <a:t>10/2/2019</a:t>
             </a:fld>
             <a:endParaRPr lang="en-US" dirty="0"/>
           </a:p>
@@ -5103,7 +5103,7 @@
             <a:fld id="{B61BEF0D-F0BB-DE4B-95CE-6DB70DBA9567}" type="datetimeFigureOut">
               <a:rPr lang="en-US" dirty="0"/>
               <a:pPr/>
-              <a:t>10/1/2019</a:t>
+              <a:t>10/2/2019</a:t>
             </a:fld>
             <a:endParaRPr lang="en-US" dirty="0"/>
           </a:p>
@@ -5331,7 +5331,7 @@
           <a:p>
             <a:fld id="{EB712588-04B1-427B-82EE-E8DB90309F08}" type="datetimeFigureOut">
               <a:rPr lang="en-US" dirty="0"/>
-              <a:t>10/1/2019</a:t>
+              <a:t>10/2/2019</a:t>
             </a:fld>
             <a:endParaRPr lang="en-US" dirty="0"/>
           </a:p>
@@ -5701,7 +5701,7 @@
             <a:fld id="{B61BEF0D-F0BB-DE4B-95CE-6DB70DBA9567}" type="datetimeFigureOut">
               <a:rPr lang="en-US" dirty="0"/>
               <a:pPr/>
-              <a:t>10/1/2019</a:t>
+              <a:t>10/2/2019</a:t>
             </a:fld>
             <a:endParaRPr lang="en-US" dirty="0"/>
           </a:p>
@@ -5821,7 +5821,7 @@
             <a:fld id="{B61BEF0D-F0BB-DE4B-95CE-6DB70DBA9567}" type="datetimeFigureOut">
               <a:rPr lang="en-US" dirty="0"/>
               <a:pPr/>
-              <a:t>10/1/2019</a:t>
+              <a:t>10/2/2019</a:t>
             </a:fld>
             <a:endParaRPr lang="en-US" dirty="0"/>
           </a:p>
@@ -5913,7 +5913,7 @@
             <a:fld id="{B61BEF0D-F0BB-DE4B-95CE-6DB70DBA9567}" type="datetimeFigureOut">
               <a:rPr lang="en-US" dirty="0"/>
               <a:pPr/>
-              <a:t>10/1/2019</a:t>
+              <a:t>10/2/2019</a:t>
             </a:fld>
             <a:endParaRPr lang="en-US" dirty="0"/>
           </a:p>
@@ -6164,7 +6164,7 @@
           <a:p>
             <a:fld id="{42A54C80-263E-416B-A8E0-580EDEADCBDC}" type="datetimeFigureOut">
               <a:rPr lang="en-US" dirty="0"/>
-              <a:t>10/1/2019</a:t>
+              <a:t>10/2/2019</a:t>
             </a:fld>
             <a:endParaRPr lang="en-US" dirty="0"/>
           </a:p>
@@ -6423,7 +6423,7 @@
             <a:fld id="{B61BEF0D-F0BB-DE4B-95CE-6DB70DBA9567}" type="datetimeFigureOut">
               <a:rPr lang="en-US" dirty="0"/>
               <a:pPr/>
-              <a:t>10/1/2019</a:t>
+              <a:t>10/2/2019</a:t>
             </a:fld>
             <a:endParaRPr lang="en-US" dirty="0"/>
           </a:p>
@@ -7163,7 +7163,7 @@
             <a:fld id="{B61BEF0D-F0BB-DE4B-95CE-6DB70DBA9567}" type="datetimeFigureOut">
               <a:rPr lang="en-US" dirty="0"/>
               <a:pPr/>
-              <a:t>10/1/2019</a:t>
+              <a:t>10/2/2019</a:t>
             </a:fld>
             <a:endParaRPr lang="en-US" dirty="0"/>
           </a:p>
@@ -8658,7 +8658,7 @@
         <p:spPr>
           <a:xfrm>
             <a:off x="0" y="6400635"/>
-            <a:ext cx="4531983" cy="461665"/>
+            <a:ext cx="4670612" cy="461665"/>
           </a:xfrm>
           <a:prstGeom prst="rect">
             <a:avLst/>
@@ -8672,11 +8672,131 @@
           <a:p>
             <a:r>
               <a:rPr lang="en-US" sz="800" i="1" dirty="0"/>
-              <a:t>The Huntington National Bank is Member FDIC. ®, Huntington® and  Huntington. Welcome.® are federally registered service marks of Huntington Bancshares Incorporated.  © 2019 Huntington Bancshares Incorporated.</a:t>
-            </a:r>
-          </a:p>
-        </p:txBody>
-      </p:sp>
+              <a:t>The Huntington National Bank is Member FDIC.    ®, Huntington® and     Huntington. Welcome.® are federally registered service marks of Huntington Bancshares Incorporated.  © 2019 Huntington Bancshares Incorporated.</a:t>
+            </a:r>
+          </a:p>
+        </p:txBody>
+      </p:sp>
+      <p:pic>
+        <p:nvPicPr>
+          <p:cNvPr id="1026" name="Picture 2" descr="Honeycomb_black">
+            <a:extLst>
+              <a:ext uri="{FF2B5EF4-FFF2-40B4-BE49-F238E27FC236}">
+                <a16:creationId xmlns:a16="http://schemas.microsoft.com/office/drawing/2014/main" id="{FBC20317-00EE-43B4-AA0E-67349CAB9E45}"/>
+              </a:ext>
+            </a:extLst>
+          </p:cNvPr>
+          <p:cNvPicPr>
+            <a:picLocks noChangeAspect="1" noChangeArrowheads="1"/>
+          </p:cNvPicPr>
+          <p:nvPr/>
+        </p:nvPicPr>
+        <p:blipFill>
+          <a:blip r:embed="rId4">
+            <a:extLst>
+              <a:ext uri="{28A0092B-C50C-407E-A947-70E740481C1C}">
+                <a14:useLocalDpi xmlns:a14="http://schemas.microsoft.com/office/drawing/2010/main" val="0"/>
+              </a:ext>
+            </a:extLst>
+          </a:blip>
+          <a:srcRect/>
+          <a:stretch>
+            <a:fillRect/>
+          </a:stretch>
+        </p:blipFill>
+        <p:spPr bwMode="auto">
+          <a:xfrm>
+            <a:off x="2257071" y="6444677"/>
+            <a:ext cx="104775" cy="123825"/>
+          </a:xfrm>
+          <a:prstGeom prst="rect">
+            <a:avLst/>
+          </a:prstGeom>
+          <a:noFill/>
+          <a:ln>
+            <a:noFill/>
+          </a:ln>
+          <a:extLst>
+            <a:ext uri="{909E8E84-426E-40DD-AFC4-6F175D3DCCD1}">
+              <a14:hiddenFill xmlns:a14="http://schemas.microsoft.com/office/drawing/2010/main">
+                <a:solidFill>
+                  <a:srgbClr val="FFFFFF"/>
+                </a:solidFill>
+              </a14:hiddenFill>
+            </a:ext>
+            <a:ext uri="{91240B29-F687-4F45-9708-019B960494DF}">
+              <a14:hiddenLine xmlns:a14="http://schemas.microsoft.com/office/drawing/2010/main" w="9525">
+                <a:solidFill>
+                  <a:srgbClr val="000000"/>
+                </a:solidFill>
+                <a:miter lim="800000"/>
+                <a:headEnd/>
+                <a:tailEnd/>
+              </a14:hiddenLine>
+            </a:ext>
+          </a:extLst>
+        </p:spPr>
+      </p:pic>
+      <p:pic>
+        <p:nvPicPr>
+          <p:cNvPr id="1027" name="Picture 3" descr="Honeycomb_black">
+            <a:extLst>
+              <a:ext uri="{FF2B5EF4-FFF2-40B4-BE49-F238E27FC236}">
+                <a16:creationId xmlns:a16="http://schemas.microsoft.com/office/drawing/2014/main" id="{FF7410C4-92BB-4F3A-AF87-0E00A6F2B667}"/>
+              </a:ext>
+            </a:extLst>
+          </p:cNvPr>
+          <p:cNvPicPr>
+            <a:picLocks noChangeAspect="1" noChangeArrowheads="1"/>
+          </p:cNvPicPr>
+          <p:nvPr/>
+        </p:nvPicPr>
+        <p:blipFill>
+          <a:blip r:embed="rId4">
+            <a:extLst>
+              <a:ext uri="{28A0092B-C50C-407E-A947-70E740481C1C}">
+                <a14:useLocalDpi xmlns:a14="http://schemas.microsoft.com/office/drawing/2010/main" val="0"/>
+              </a:ext>
+            </a:extLst>
+          </a:blip>
+          <a:srcRect/>
+          <a:stretch>
+            <a:fillRect/>
+          </a:stretch>
+        </p:blipFill>
+        <p:spPr bwMode="auto">
+          <a:xfrm>
+            <a:off x="3323300" y="6444677"/>
+            <a:ext cx="104775" cy="123825"/>
+          </a:xfrm>
+          <a:prstGeom prst="rect">
+            <a:avLst/>
+          </a:prstGeom>
+          <a:noFill/>
+          <a:ln>
+            <a:noFill/>
+          </a:ln>
+          <a:extLst>
+            <a:ext uri="{909E8E84-426E-40DD-AFC4-6F175D3DCCD1}">
+              <a14:hiddenFill xmlns:a14="http://schemas.microsoft.com/office/drawing/2010/main">
+                <a:solidFill>
+                  <a:srgbClr val="FFFFFF"/>
+                </a:solidFill>
+              </a14:hiddenFill>
+            </a:ext>
+            <a:ext uri="{91240B29-F687-4F45-9708-019B960494DF}">
+              <a14:hiddenLine xmlns:a14="http://schemas.microsoft.com/office/drawing/2010/main" w="9525">
+                <a:solidFill>
+                  <a:srgbClr val="000000"/>
+                </a:solidFill>
+                <a:miter lim="800000"/>
+                <a:headEnd/>
+                <a:tailEnd/>
+              </a14:hiddenLine>
+            </a:ext>
+          </a:extLst>
+        </p:spPr>
+      </p:pic>
     </p:spTree>
     <p:extLst>
       <p:ext uri="{BB962C8B-B14F-4D97-AF65-F5344CB8AC3E}">
@@ -14694,12 +14814,6 @@
 </file>
 
 <file path=customXml/item1.xml><?xml version="1.0" encoding="utf-8"?>
-<p:properties xmlns:p="http://schemas.microsoft.com/office/2006/metadata/properties" xmlns:xsi="http://www.w3.org/2001/XMLSchema-instance" xmlns:pc="http://schemas.microsoft.com/office/infopath/2007/PartnerControls">
-  <documentManagement/>
-</p:properties>
-</file>
-
-<file path=customXml/item2.xml><?xml version="1.0" encoding="utf-8"?>
 <ct:contentTypeSchema xmlns:ct="http://schemas.microsoft.com/office/2006/metadata/contentType" xmlns:ma="http://schemas.microsoft.com/office/2006/metadata/properties/metaAttributes" ct:_="" ma:_="" ma:contentTypeName="Document" ma:contentTypeID="0x010100999C4FC1E27B604AB083C5A2EF450DFC" ma:contentTypeVersion="0" ma:contentTypeDescription="Create a new document." ma:contentTypeScope="" ma:versionID="33e62442aba9e8183c430b9529e05696">
   <xsd:schema xmlns:xsd="http://www.w3.org/2001/XMLSchema" xmlns:xs="http://www.w3.org/2001/XMLSchema" xmlns:p="http://schemas.microsoft.com/office/2006/metadata/properties" targetNamespace="http://schemas.microsoft.com/office/2006/metadata/properties" ma:root="true" ma:fieldsID="1b05d82d297216baf5b26c55225140df">
     <xsd:element name="properties">
@@ -14813,6 +14927,12 @@
 </ct:contentTypeSchema>
 </file>
 
+<file path=customXml/item2.xml><?xml version="1.0" encoding="utf-8"?>
+<p:properties xmlns:p="http://schemas.microsoft.com/office/2006/metadata/properties" xmlns:xsi="http://www.w3.org/2001/XMLSchema-instance" xmlns:pc="http://schemas.microsoft.com/office/infopath/2007/PartnerControls">
+  <documentManagement/>
+</p:properties>
+</file>
+
 <file path=customXml/item3.xml><?xml version="1.0" encoding="utf-8"?>
 <?mso-contentType ?>
 <FormTemplates xmlns="http://schemas.microsoft.com/sharepoint/v3/contenttype/forms">
@@ -14823,21 +14943,6 @@
 </file>
 
 <file path=customXml/itemProps1.xml><?xml version="1.0" encoding="utf-8"?>
-<ds:datastoreItem xmlns:ds="http://schemas.openxmlformats.org/officeDocument/2006/customXml" ds:itemID="{1216D02C-A6EB-45B3-A6B2-3D1DF222F307}">
-  <ds:schemaRefs>
-    <ds:schemaRef ds:uri="http://purl.org/dc/terms/"/>
-    <ds:schemaRef ds:uri="http://schemas.openxmlformats.org/package/2006/metadata/core-properties"/>
-    <ds:schemaRef ds:uri="http://schemas.microsoft.com/office/2006/documentManagement/types"/>
-    <ds:schemaRef ds:uri="http://schemas.microsoft.com/office/infopath/2007/PartnerControls"/>
-    <ds:schemaRef ds:uri="http://purl.org/dc/elements/1.1/"/>
-    <ds:schemaRef ds:uri="http://schemas.microsoft.com/office/2006/metadata/properties"/>
-    <ds:schemaRef ds:uri="http://www.w3.org/XML/1998/namespace"/>
-    <ds:schemaRef ds:uri="http://purl.org/dc/dcmitype/"/>
-  </ds:schemaRefs>
-</ds:datastoreItem>
-</file>
-
-<file path=customXml/itemProps2.xml><?xml version="1.0" encoding="utf-8"?>
 <ds:datastoreItem xmlns:ds="http://schemas.openxmlformats.org/officeDocument/2006/customXml" ds:itemID="{A8ED9177-9849-439D-B4A9-EBD14F4EE18D}">
   <ds:schemaRefs>
     <ds:schemaRef ds:uri="http://schemas.microsoft.com/office/2006/metadata/contentType"/>
@@ -14853,6 +14958,21 @@
 </ds:datastoreItem>
 </file>
 
+<file path=customXml/itemProps2.xml><?xml version="1.0" encoding="utf-8"?>
+<ds:datastoreItem xmlns:ds="http://schemas.openxmlformats.org/officeDocument/2006/customXml" ds:itemID="{1216D02C-A6EB-45B3-A6B2-3D1DF222F307}">
+  <ds:schemaRefs>
+    <ds:schemaRef ds:uri="http://schemas.microsoft.com/office/infopath/2007/PartnerControls"/>
+    <ds:schemaRef ds:uri="http://purl.org/dc/elements/1.1/"/>
+    <ds:schemaRef ds:uri="http://schemas.microsoft.com/office/2006/metadata/properties"/>
+    <ds:schemaRef ds:uri="http://schemas.microsoft.com/office/2006/documentManagement/types"/>
+    <ds:schemaRef ds:uri="http://purl.org/dc/terms/"/>
+    <ds:schemaRef ds:uri="http://schemas.openxmlformats.org/package/2006/metadata/core-properties"/>
+    <ds:schemaRef ds:uri="http://purl.org/dc/dcmitype/"/>
+    <ds:schemaRef ds:uri="http://www.w3.org/XML/1998/namespace"/>
+  </ds:schemaRefs>
+</ds:datastoreItem>
+</file>
+
 <file path=customXml/itemProps3.xml><?xml version="1.0" encoding="utf-8"?>
 <ds:datastoreItem xmlns:ds="http://schemas.openxmlformats.org/officeDocument/2006/customXml" ds:itemID="{F218C08F-A677-43C3-BF8E-C9EC5ECE9826}">
   <ds:schemaRefs>

</xml_diff>